<commit_message>
L15 Add home task
</commit_message>
<xml_diff>
--- a/Lectures/Lesson 15 - Spring Framework.pptx
+++ b/Lectures/Lesson 15 - Spring Framework.pptx
@@ -31,7 +31,7 @@
     <p:sldId id="476" r:id="rId22"/>
     <p:sldId id="477" r:id="rId23"/>
     <p:sldId id="280" r:id="rId24"/>
-    <p:sldId id="478" r:id="rId25"/>
+    <p:sldId id="481" r:id="rId25"/>
   </p:sldIdLst>
   <p:sldSz cx="12192000" cy="6858000"/>
   <p:notesSz cx="6858000" cy="9144000"/>
@@ -378,7 +378,7 @@
           <a:p>
             <a:fld id="{812D7E2C-03C1-4B92-BBE3-2FB5C5D5BF8B}" type="slidenum">
               <a:rPr lang="ru-RU" smtClean="0"/>
-              <a:t>‹№›</a:t>
+              <a:t>‹#›</a:t>
             </a:fld>
             <a:endParaRPr lang="ru-RU"/>
           </a:p>
@@ -826,7 +826,7 @@
           <a:p>
             <a:fld id="{1953C272-8C72-41F6-9C12-11750B48D95E}" type="slidenum">
               <a:rPr lang="ru-RU" smtClean="0"/>
-              <a:t>‹№›</a:t>
+              <a:t>‹#›</a:t>
             </a:fld>
             <a:endParaRPr lang="ru-RU"/>
           </a:p>
@@ -994,7 +994,7 @@
           <a:p>
             <a:fld id="{1953C272-8C72-41F6-9C12-11750B48D95E}" type="slidenum">
               <a:rPr lang="ru-RU" smtClean="0"/>
-              <a:t>‹№›</a:t>
+              <a:t>‹#›</a:t>
             </a:fld>
             <a:endParaRPr lang="ru-RU"/>
           </a:p>
@@ -1172,7 +1172,7 @@
           <a:p>
             <a:fld id="{1953C272-8C72-41F6-9C12-11750B48D95E}" type="slidenum">
               <a:rPr lang="ru-RU" smtClean="0"/>
-              <a:t>‹№›</a:t>
+              <a:t>‹#›</a:t>
             </a:fld>
             <a:endParaRPr lang="ru-RU"/>
           </a:p>
@@ -1340,7 +1340,7 @@
           <a:p>
             <a:fld id="{1953C272-8C72-41F6-9C12-11750B48D95E}" type="slidenum">
               <a:rPr lang="ru-RU" smtClean="0"/>
-              <a:t>‹№›</a:t>
+              <a:t>‹#›</a:t>
             </a:fld>
             <a:endParaRPr lang="ru-RU"/>
           </a:p>
@@ -1585,7 +1585,7 @@
           <a:p>
             <a:fld id="{1953C272-8C72-41F6-9C12-11750B48D95E}" type="slidenum">
               <a:rPr lang="ru-RU" smtClean="0"/>
-              <a:t>‹№›</a:t>
+              <a:t>‹#›</a:t>
             </a:fld>
             <a:endParaRPr lang="ru-RU"/>
           </a:p>
@@ -1814,7 +1814,7 @@
           <a:p>
             <a:fld id="{1953C272-8C72-41F6-9C12-11750B48D95E}" type="slidenum">
               <a:rPr lang="ru-RU" smtClean="0"/>
-              <a:t>‹№›</a:t>
+              <a:t>‹#›</a:t>
             </a:fld>
             <a:endParaRPr lang="ru-RU"/>
           </a:p>
@@ -2178,7 +2178,7 @@
           <a:p>
             <a:fld id="{1953C272-8C72-41F6-9C12-11750B48D95E}" type="slidenum">
               <a:rPr lang="ru-RU" smtClean="0"/>
-              <a:t>‹№›</a:t>
+              <a:t>‹#›</a:t>
             </a:fld>
             <a:endParaRPr lang="ru-RU"/>
           </a:p>
@@ -2295,7 +2295,7 @@
           <a:p>
             <a:fld id="{1953C272-8C72-41F6-9C12-11750B48D95E}" type="slidenum">
               <a:rPr lang="ru-RU" smtClean="0"/>
-              <a:t>‹№›</a:t>
+              <a:t>‹#›</a:t>
             </a:fld>
             <a:endParaRPr lang="ru-RU"/>
           </a:p>
@@ -2390,7 +2390,7 @@
           <a:p>
             <a:fld id="{1953C272-8C72-41F6-9C12-11750B48D95E}" type="slidenum">
               <a:rPr lang="ru-RU" smtClean="0"/>
-              <a:t>‹№›</a:t>
+              <a:t>‹#›</a:t>
             </a:fld>
             <a:endParaRPr lang="ru-RU"/>
           </a:p>
@@ -2665,7 +2665,7 @@
           <a:p>
             <a:fld id="{1953C272-8C72-41F6-9C12-11750B48D95E}" type="slidenum">
               <a:rPr lang="ru-RU" smtClean="0"/>
-              <a:t>‹№›</a:t>
+              <a:t>‹#›</a:t>
             </a:fld>
             <a:endParaRPr lang="ru-RU"/>
           </a:p>
@@ -2917,7 +2917,7 @@
           <a:p>
             <a:fld id="{1953C272-8C72-41F6-9C12-11750B48D95E}" type="slidenum">
               <a:rPr lang="ru-RU" smtClean="0"/>
-              <a:t>‹№›</a:t>
+              <a:t>‹#›</a:t>
             </a:fld>
             <a:endParaRPr lang="ru-RU"/>
           </a:p>
@@ -3164,7 +3164,7 @@
           <a:p>
             <a:fld id="{1953C272-8C72-41F6-9C12-11750B48D95E}" type="slidenum">
               <a:rPr lang="ru-RU" smtClean="0"/>
-              <a:t>‹№›</a:t>
+              <a:t>‹#›</a:t>
             </a:fld>
             <a:endParaRPr lang="ru-RU"/>
           </a:p>
@@ -3931,18 +3931,23 @@
         <p:spPr/>
         <p:txBody>
           <a:bodyPr>
-            <a:normAutofit fontScale="92500" lnSpcReduction="20000"/>
+            <a:normAutofit fontScale="92500"/>
           </a:bodyPr>
           <a:lstStyle/>
           <a:p>
-            <a:pPr>
+            <a:pPr marL="0" indent="0">
               <a:lnSpc>
                 <a:spcPct val="150000"/>
               </a:lnSpc>
+              <a:buNone/>
             </a:pPr>
             <a:r>
+              <a:rPr lang="en-US" dirty="0" smtClean="0"/>
+              <a:t>	The </a:t>
+            </a:r>
+            <a:r>
               <a:rPr lang="en-US" dirty="0"/>
-              <a:t>The Spring Framework is an application framework and inversion of control container for the Java platform. The framework's core features can be used by any Java application, but there are extensions for building web applications on top of the Java EE (Enterprise Edition) platform. Although the framework does not impose any specific programming model, it has become popular in the Java community as an addition to, or even replacement for the Enterprise JavaBeans (EJB) model. The Spring Framework is open source.</a:t>
+              <a:t>Spring Framework is an application framework and inversion of control container for the Java platform. The framework's core features can be used by any Java application, but there are extensions for building web applications on top of the Java EE (Enterprise Edition) platform. Although the framework does not impose any specific programming model, it has become popular in the Java community as an addition to, or even replacement for the Enterprise JavaBeans (EJB) model. The Spring Framework is open source.</a:t>
             </a:r>
           </a:p>
         </p:txBody>
@@ -5887,23 +5892,7 @@
             </a:pPr>
             <a:r>
               <a:rPr lang="en-US" dirty="0"/>
-              <a:t>The </a:t>
-            </a:r>
-            <a:r>
-              <a:rPr lang="en-US" dirty="0" err="1"/>
-              <a:t>ApplicationContext</a:t>
-            </a:r>
-            <a:r>
-              <a:rPr lang="en-US" dirty="0"/>
-              <a:t> is the central interface within a Spring application for providing configuration information to the application. It is read-only at run time, but can be reloaded if necessary and supported by the application. A number of classes implement the </a:t>
-            </a:r>
-            <a:r>
-              <a:rPr lang="en-US" dirty="0" err="1"/>
-              <a:t>ApplicationContext</a:t>
-            </a:r>
-            <a:r>
-              <a:rPr lang="en-US" dirty="0"/>
-              <a:t> interface, allowing for a variety of configuration options and types of applications.</a:t>
+              <a:t>The ApplicationContext is the central interface within a Spring application for providing configuration information to the application. It is read-only at run time, but can be reloaded if necessary and supported by the application. A number of classes implement the ApplicationContext interface, allowing for a variety of configuration options and types of applications.</a:t>
             </a:r>
           </a:p>
         </p:txBody>
@@ -7217,7 +7206,7 @@
           <a:lstStyle/>
           <a:p>
             <a:r>
-              <a:rPr lang="en-US" dirty="0" err="1"/>
+              <a:rPr lang="en-US" dirty="0"/>
               <a:t>ApplicationContext</a:t>
             </a:r>
             <a:endParaRPr lang="uk-UA" dirty="0"/>
@@ -7335,15 +7324,7 @@
             </a:pPr>
             <a:r>
               <a:rPr lang="en-US" dirty="0"/>
-              <a:t>The </a:t>
-            </a:r>
-            <a:r>
-              <a:rPr lang="en-US" dirty="0" err="1"/>
-              <a:t>ApplicationContext</a:t>
-            </a:r>
-            <a:r>
-              <a:rPr lang="en-US" dirty="0"/>
-              <a:t> provides:</a:t>
+              <a:t>The ApplicationContext provides:</a:t>
             </a:r>
           </a:p>
           <a:p>
@@ -8712,7 +8693,7 @@
           <a:lstStyle/>
           <a:p>
             <a:r>
-              <a:rPr lang="en-US" dirty="0" err="1"/>
+              <a:rPr lang="en-US" dirty="0"/>
               <a:t>ApplicationContext</a:t>
             </a:r>
             <a:endParaRPr lang="uk-UA" dirty="0"/>
@@ -9154,19 +9135,7 @@
                         <a:rPr lang="en-US" sz="1400" dirty="0">
                           <a:effectLst/>
                         </a:rPr>
-                        <a:t>Scopes a single bean definition to any number of object instances. New object will be created every time on getting from </a:t>
-                      </a:r>
-                      <a:r>
-                        <a:rPr lang="en-US" sz="1400" dirty="0" err="1">
-                          <a:effectLst/>
-                        </a:rPr>
-                        <a:t>ApplicationContext</a:t>
-                      </a:r>
-                      <a:r>
-                        <a:rPr lang="en-US" sz="1400" dirty="0">
-                          <a:effectLst/>
-                        </a:rPr>
-                        <a:t>.</a:t>
+                        <a:t>Scopes a single bean definition to any number of object instances. New object will be created every time on getting from ApplicationContext.</a:t>
                       </a:r>
                     </a:p>
                   </a:txBody>
@@ -9285,19 +9254,7 @@
                         <a:rPr lang="en-US" sz="1400" dirty="0">
                           <a:effectLst/>
                         </a:rPr>
-                        <a:t>Scopes a single bean definition to the lifecycle of a single HTTP request; that is each and every HTTP request will have its own instance of a bean created off the back of a single bean definition. Only valid in the context of a web-aware Spring </a:t>
-                      </a:r>
-                      <a:r>
-                        <a:rPr lang="en-US" sz="1400" dirty="0" err="1">
-                          <a:effectLst/>
-                        </a:rPr>
-                        <a:t>ApplicationContext</a:t>
-                      </a:r>
-                      <a:r>
-                        <a:rPr lang="en-US" sz="1400" dirty="0">
-                          <a:effectLst/>
-                        </a:rPr>
-                        <a:t>.</a:t>
+                        <a:t>Scopes a single bean definition to the lifecycle of a single HTTP request; that is each and every HTTP request will have its own instance of a bean created off the back of a single bean definition. Only valid in the context of a web-aware Spring ApplicationContext.</a:t>
                       </a:r>
                     </a:p>
                   </a:txBody>
@@ -9413,7 +9370,7 @@
                     <a:p>
                       <a:pPr algn="just"/>
                       <a:r>
-                        <a:rPr lang="en-US" sz="1400">
+                        <a:rPr lang="en-US" sz="1400" dirty="0">
                           <a:effectLst/>
                         </a:rPr>
                         <a:t>Scopes a single bean definition to the lifecycle of a HTTP Session. Only valid in the context of a web-aware Spring ApplicationContext.</a:t>
@@ -9535,19 +9492,7 @@
                         <a:rPr lang="en-US" sz="1400" dirty="0">
                           <a:effectLst/>
                         </a:rPr>
-                        <a:t>Scopes a single bean definition to the lifecycle of a global HTTP Session. Typically only valid when used in a portlet context. Only valid in the context of a web-aware Spring </a:t>
-                      </a:r>
-                      <a:r>
-                        <a:rPr lang="en-US" sz="1400" dirty="0" err="1">
-                          <a:effectLst/>
-                        </a:rPr>
-                        <a:t>ApplicationContext</a:t>
-                      </a:r>
-                      <a:r>
-                        <a:rPr lang="en-US" sz="1400" dirty="0">
-                          <a:effectLst/>
-                        </a:rPr>
-                        <a:t>.</a:t>
+                        <a:t>Scopes a single bean definition to the lifecycle of a global HTTP Session. Typically only valid when used in a portlet context. Only valid in the context of a web-aware Spring ApplicationContext.</a:t>
                       </a:r>
                     </a:p>
                   </a:txBody>
@@ -9704,7 +9649,7 @@
             <p:ph idx="1"/>
             <p:extLst>
               <p:ext uri="{D42A27DB-BD31-4B8C-83A1-F6EECF244321}">
-                <p14:modId xmlns:p14="http://schemas.microsoft.com/office/powerpoint/2010/main" val="3031628113"/>
+                <p14:modId xmlns:p14="http://schemas.microsoft.com/office/powerpoint/2010/main" val="947310860"/>
               </p:ext>
             </p:extLst>
           </p:nvPr>
@@ -10059,16 +10004,16 @@
                         <a:t>This attribute specifies the bean identifier uniquely. In </a:t>
                       </a:r>
                       <a:r>
-                        <a:rPr lang="en-US" sz="1400" dirty="0" err="1">
+                        <a:rPr lang="en-US" sz="1400" dirty="0" smtClean="0">
                           <a:effectLst/>
                         </a:rPr>
-                        <a:t>XMLbased</a:t>
+                        <a:t>XML-based </a:t>
                       </a:r>
                       <a:r>
                         <a:rPr lang="en-US" sz="1400" dirty="0">
                           <a:effectLst/>
                         </a:rPr>
-                        <a:t> configuration metadata, you use the id and/or name attributes to specify the bean identifier(s).</a:t>
+                        <a:t>configuration metadata, you use the id and/or name attributes to specify the bean identifier(s).</a:t>
                       </a:r>
                     </a:p>
                   </a:txBody>
@@ -12224,25 +12169,25 @@
         <p:spPr/>
         <p:txBody>
           <a:bodyPr>
-            <a:normAutofit/>
+            <a:normAutofit fontScale="85000" lnSpcReduction="20000"/>
           </a:bodyPr>
           <a:lstStyle/>
           <a:p>
-            <a:pPr lvl="1">
+            <a:pPr>
               <a:lnSpc>
                 <a:spcPct val="150000"/>
               </a:lnSpc>
             </a:pPr>
             <a:r>
-              <a:rPr lang="en-US" dirty="0">
+              <a:rPr lang="it-IT" dirty="0">
                 <a:hlinkClick r:id="rId3"/>
               </a:rPr>
-              <a:t>Service Locator Pattern example</a:t>
+              <a:t>Java Design Patterns - Service Locator</a:t>
             </a:r>
             <a:endParaRPr lang="en-US" dirty="0"/>
           </a:p>
           <a:p>
-            <a:pPr lvl="1">
+            <a:pPr>
               <a:lnSpc>
                 <a:spcPct val="150000"/>
               </a:lnSpc>
@@ -12251,12 +12196,12 @@
               <a:rPr lang="en-US" dirty="0">
                 <a:hlinkClick r:id="rId4"/>
               </a:rPr>
-              <a:t>Dependency Injection Pattern example</a:t>
+              <a:t>Java Design Patterns - Dependency Injection</a:t>
             </a:r>
             <a:endParaRPr lang="en-US" dirty="0"/>
           </a:p>
           <a:p>
-            <a:pPr lvl="1">
+            <a:pPr>
               <a:lnSpc>
                 <a:spcPct val="150000"/>
               </a:lnSpc>
@@ -12265,12 +12210,12 @@
               <a:rPr lang="en-US" dirty="0">
                 <a:hlinkClick r:id="rId5"/>
               </a:rPr>
-              <a:t>Template Method Pattern example</a:t>
+              <a:t>Java Design Patterns - Template Method</a:t>
             </a:r>
             <a:endParaRPr lang="en-US" dirty="0"/>
           </a:p>
           <a:p>
-            <a:pPr lvl="1">
+            <a:pPr>
               <a:lnSpc>
                 <a:spcPct val="150000"/>
               </a:lnSpc>
@@ -12279,12 +12224,12 @@
               <a:rPr lang="en-US" dirty="0">
                 <a:hlinkClick r:id="rId6"/>
               </a:rPr>
-              <a:t>Strategy Pattern example</a:t>
+              <a:t>Java Design Patterns - Strategy</a:t>
             </a:r>
             <a:endParaRPr lang="en-US" dirty="0"/>
           </a:p>
           <a:p>
-            <a:pPr lvl="1">
+            <a:pPr>
               <a:lnSpc>
                 <a:spcPct val="150000"/>
               </a:lnSpc>
@@ -12293,12 +12238,18 @@
               <a:rPr lang="en-US" dirty="0">
                 <a:hlinkClick r:id="rId7"/>
               </a:rPr>
-              <a:t>Spring Tutorial</a:t>
+              <a:t>Spring </a:t>
+            </a:r>
+            <a:r>
+              <a:rPr lang="en-US" dirty="0">
+                <a:hlinkClick r:id="rId7"/>
+              </a:rPr>
+              <a:t>Tutorial</a:t>
             </a:r>
             <a:endParaRPr lang="en-US" dirty="0"/>
           </a:p>
           <a:p>
-            <a:pPr lvl="1">
+            <a:pPr>
               <a:lnSpc>
                 <a:spcPct val="150000"/>
               </a:lnSpc>
@@ -12307,7 +12258,33 @@
               <a:rPr lang="en-US" dirty="0">
                 <a:hlinkClick r:id="rId8"/>
               </a:rPr>
-              <a:t>Spring Framework Docs</a:t>
+              <a:t>Spring Framework </a:t>
+            </a:r>
+            <a:r>
+              <a:rPr lang="en-US" dirty="0">
+                <a:hlinkClick r:id="rId8"/>
+              </a:rPr>
+              <a:t>Docs</a:t>
+            </a:r>
+            <a:endParaRPr lang="en-US" dirty="0"/>
+          </a:p>
+          <a:p>
+            <a:pPr>
+              <a:lnSpc>
+                <a:spcPct val="150000"/>
+              </a:lnSpc>
+            </a:pPr>
+            <a:r>
+              <a:rPr lang="en-US" dirty="0">
+                <a:hlinkClick r:id="rId9"/>
+              </a:rPr>
+              <a:t>Inversion of Control and Dependency Injection in </a:t>
+            </a:r>
+            <a:r>
+              <a:rPr lang="en-US" dirty="0" smtClean="0">
+                <a:hlinkClick r:id="rId9"/>
+              </a:rPr>
+              <a:t>Spring</a:t>
             </a:r>
             <a:endParaRPr lang="en-US" dirty="0"/>
           </a:p>
@@ -12406,46 +12383,64 @@
         </p:nvSpPr>
         <p:spPr/>
         <p:txBody>
-          <a:bodyPr/>
-          <a:lstStyle/>
-          <a:p>
-            <a:endParaRPr lang="en-US" dirty="0"/>
-          </a:p>
-        </p:txBody>
-      </p:sp>
-      <p:sp>
-        <p:nvSpPr>
-          <p:cNvPr id="4" name="Місце для номера слайда 3">
-            <a:extLst>
-              <a:ext uri="{FF2B5EF4-FFF2-40B4-BE49-F238E27FC236}">
-                <a16:creationId xmlns:a16="http://schemas.microsoft.com/office/drawing/2014/main" id="{D14F2688-9BA2-4278-B11D-52B432BA5338}"/>
-              </a:ext>
-            </a:extLst>
-          </p:cNvPr>
-          <p:cNvSpPr>
-            <a:spLocks noGrp="1"/>
-          </p:cNvSpPr>
-          <p:nvPr>
-            <p:ph type="sldNum" sz="quarter" idx="12"/>
-          </p:nvPr>
-        </p:nvSpPr>
-        <p:spPr/>
-        <p:txBody>
-          <a:bodyPr/>
-          <a:lstStyle/>
-          <a:p>
-            <a:fld id="{1953C272-8C72-41F6-9C12-11750B48D95E}" type="slidenum">
-              <a:rPr lang="ru-RU" smtClean="0"/>
-              <a:t>24</a:t>
-            </a:fld>
-            <a:endParaRPr lang="ru-RU"/>
+          <a:bodyPr vert="horz" lIns="91440" tIns="45720" rIns="91440" bIns="45720" rtlCol="0" anchor="t">
+            <a:normAutofit/>
+          </a:bodyPr>
+          <a:lstStyle/>
+          <a:p>
+            <a:pPr marL="0" indent="0">
+              <a:lnSpc>
+                <a:spcPct val="150000"/>
+              </a:lnSpc>
+              <a:buNone/>
+            </a:pPr>
+            <a:r>
+              <a:rPr lang="en-US" dirty="0" smtClean="0"/>
+              <a:t>	Implement </a:t>
+            </a:r>
+            <a:r>
+              <a:rPr lang="en-US" dirty="0"/>
+              <a:t>user management </a:t>
+            </a:r>
+            <a:r>
+              <a:rPr lang="en-US" dirty="0" smtClean="0"/>
+              <a:t>API protected </a:t>
+            </a:r>
+            <a:r>
+              <a:rPr lang="en-US" dirty="0"/>
+              <a:t>with authentication by login and </a:t>
+            </a:r>
+            <a:r>
+              <a:rPr lang="en-US" dirty="0" smtClean="0"/>
+              <a:t>password.</a:t>
+            </a:r>
+            <a:endParaRPr lang="en-US" dirty="0">
+              <a:hlinkClick r:id="rId2"/>
+            </a:endParaRPr>
+          </a:p>
+          <a:p>
+            <a:pPr marL="0" indent="0">
+              <a:lnSpc>
+                <a:spcPct val="150000"/>
+              </a:lnSpc>
+              <a:buNone/>
+            </a:pPr>
+            <a:r>
+              <a:rPr lang="en-US" dirty="0" smtClean="0">
+                <a:hlinkClick r:id="rId2"/>
+              </a:rPr>
+              <a:t>Requirements</a:t>
+            </a:r>
+            <a:endParaRPr lang="en-US" dirty="0">
+              <a:cs typeface="Calibri"/>
+            </a:endParaRPr>
           </a:p>
         </p:txBody>
       </p:sp>
     </p:spTree>
     <p:extLst>
       <p:ext uri="{BB962C8B-B14F-4D97-AF65-F5344CB8AC3E}">
-        <p14:creationId xmlns:p14="http://schemas.microsoft.com/office/powerpoint/2010/main" val="2113383468"/>
+        <p14:creationId xmlns:p14="http://schemas.microsoft.com/office/powerpoint/2010/main" val="2215062148"/>
       </p:ext>
     </p:extLst>
   </p:cSld>
@@ -12512,14 +12507,19 @@
           </a:bodyPr>
           <a:lstStyle/>
           <a:p>
-            <a:pPr>
+            <a:pPr marL="0" indent="0">
               <a:lnSpc>
                 <a:spcPct val="150000"/>
               </a:lnSpc>
+              <a:buNone/>
             </a:pPr>
             <a:r>
+              <a:rPr lang="en-US" dirty="0" smtClean="0"/>
+              <a:t>	In </a:t>
+            </a:r>
+            <a:r>
               <a:rPr lang="en-US" dirty="0"/>
-              <a:t>In software engineering, inversion of control (</a:t>
+              <a:t>software engineering, inversion of control (</a:t>
             </a:r>
             <a:r>
               <a:rPr lang="en-US" dirty="0" err="1"/>
@@ -12627,7 +12627,7 @@
         <p:spPr/>
         <p:txBody>
           <a:bodyPr>
-            <a:normAutofit fontScale="70000" lnSpcReduction="20000"/>
+            <a:normAutofit fontScale="62500" lnSpcReduction="20000"/>
           </a:bodyPr>
           <a:lstStyle/>
           <a:p>
@@ -12881,9 +12881,16 @@
           </a:bodyPr>
           <a:lstStyle/>
           <a:p>
-            <a:r>
-              <a:rPr lang="en-US" sz="2000" dirty="0"/>
-              <a:t>Define the skeleton of an algorithm in an operation, deferring some steps to subclasses. Template method lets subclasses redefine certain steps of an algorithm without changing the algorithm's structure.</a:t>
+            <a:pPr marL="0" indent="0">
+              <a:buNone/>
+            </a:pPr>
+            <a:r>
+              <a:rPr lang="en-US" sz="2400" dirty="0" smtClean="0"/>
+              <a:t>Define </a:t>
+            </a:r>
+            <a:r>
+              <a:rPr lang="en-US" sz="2400" dirty="0"/>
+              <a:t>the skeleton of an algorithm in an operation, deferring some steps to subclasses. Template method lets subclasses redefine certain steps of an algorithm without changing the algorithm's structure.</a:t>
             </a:r>
           </a:p>
         </p:txBody>
@@ -13222,9 +13229,16 @@
           </a:bodyPr>
           <a:lstStyle/>
           <a:p>
-            <a:r>
-              <a:rPr lang="en-US" sz="2000" dirty="0"/>
-              <a:t>Define a family of algorithms, encapsulate each one, and make them interchangeable. Strategy lets the algorithm vary independently from clients that use it.</a:t>
+            <a:pPr marL="0" indent="0">
+              <a:buNone/>
+            </a:pPr>
+            <a:r>
+              <a:rPr lang="en-US" sz="2400" dirty="0" smtClean="0"/>
+              <a:t>	Define </a:t>
+            </a:r>
+            <a:r>
+              <a:rPr lang="en-US" sz="2400" dirty="0"/>
+              <a:t>a family of algorithms, encapsulate each one, and make them interchangeable. Strategy lets the algorithm vary independently from clients that use it.</a:t>
             </a:r>
           </a:p>
         </p:txBody>
@@ -13462,19 +13476,26 @@
         </p:nvSpPr>
         <p:spPr>
           <a:xfrm>
-            <a:off x="7552944" y="1825625"/>
-            <a:ext cx="3800856" cy="4351338"/>
+            <a:off x="6671256" y="1825625"/>
+            <a:ext cx="4682544" cy="4351338"/>
           </a:xfrm>
         </p:spPr>
         <p:txBody>
           <a:bodyPr>
-            <a:normAutofit/>
+            <a:noAutofit/>
           </a:bodyPr>
           <a:lstStyle/>
           <a:p>
-            <a:r>
-              <a:rPr lang="en-US" sz="2000" dirty="0"/>
-              <a:t>The service locator pattern is a design pattern used in software development to encapsulate the processes involved in obtaining a service with a strong abstraction layer. This pattern uses a central registry known as the "service locator", which on request returns the information necessary to perform a certain task. Note that many consider service locator to actually be an anti-pattern.</a:t>
+            <a:pPr marL="0" indent="0">
+              <a:buNone/>
+            </a:pPr>
+            <a:r>
+              <a:rPr lang="en-US" sz="2400" dirty="0" smtClean="0"/>
+              <a:t>	The </a:t>
+            </a:r>
+            <a:r>
+              <a:rPr lang="en-US" sz="2400" dirty="0"/>
+              <a:t>service locator pattern is a design pattern used in software development to encapsulate the processes involved in obtaining a service with a strong abstraction layer. This pattern uses a central registry known as the "service locator", which on request returns the information necessary to perform a certain task. Note that many consider service locator to actually be an anti-pattern.</a:t>
             </a:r>
           </a:p>
         </p:txBody>

</xml_diff>